<commit_message>
test add diff font color to a paragraph
</commit_message>
<xml_diff>
--- a/pptx/result/table.pptx
+++ b/pptx/result/table.pptx
@@ -3177,6 +3177,14 @@
                     <a:p>
                       <a:r>
                         <a:t>go down together</a:t>
+                      </a:r>
+                      <a:r>
+                        <a:rPr>
+                          <a:solidFill>
+                            <a:srgbClr val="FF0000"/>
+                          </a:solidFill>
+                        </a:rPr>
+                        <a:t>FFFFFFFF</a:t>
                       </a:r>
                     </a:p>
                     <a:p>

</xml_diff>